<commit_message>
Corrected how to translate lambdas in cpp
</commit_message>
<xml_diff>
--- a/lambda/cpp/lambda_cpp.pptx
+++ b/lambda/cpp/lambda_cpp.pptx
@@ -4438,11 +4438,7 @@
             </a:r>
             <a:r>
               <a:rPr lang="ko-KR" altLang="en-US" sz="3200" b="1" dirty="0" smtClean="0"/>
-              <a:t>템플릿 함수의 </a:t>
-            </a:r>
-            <a:r>
-              <a:rPr lang="ko-KR" altLang="en-US" sz="3200" b="1" dirty="0" smtClean="0"/>
-              <a:t>인자</a:t>
+              <a:t>템플릿 함수의 인자</a:t>
             </a:r>
             <a:r>
               <a:rPr lang="en-US" altLang="ko-KR" sz="3200" b="1" dirty="0" smtClean="0"/>
@@ -4586,7 +4582,7 @@
                   <a:srgbClr val="FF0000"/>
                 </a:solidFill>
               </a:rPr>
-              <a:t>[] (</a:t>
+              <a:t>[</a:t>
             </a:r>
             <a:r>
               <a:rPr lang="en-US" altLang="ko-KR" dirty="0" err="1" smtClean="0">
@@ -4594,6 +4590,30 @@
                   <a:srgbClr val="FF0000"/>
                 </a:solidFill>
               </a:rPr>
+              <a:t>sz</a:t>
+            </a:r>
+            <a:r>
+              <a:rPr lang="en-US" altLang="ko-KR" dirty="0" smtClean="0">
+                <a:solidFill>
+                  <a:srgbClr val="FF0000"/>
+                </a:solidFill>
+              </a:rPr>
+              <a:t>] </a:t>
+            </a:r>
+            <a:r>
+              <a:rPr lang="en-US" altLang="ko-KR" dirty="0" smtClean="0">
+                <a:solidFill>
+                  <a:srgbClr val="FF0000"/>
+                </a:solidFill>
+              </a:rPr>
+              <a:t>(</a:t>
+            </a:r>
+            <a:r>
+              <a:rPr lang="en-US" altLang="ko-KR" dirty="0" err="1" smtClean="0">
+                <a:solidFill>
+                  <a:srgbClr val="FF0000"/>
+                </a:solidFill>
+              </a:rPr>
               <a:t>const</a:t>
             </a:r>
             <a:r>
@@ -4618,15 +4638,7 @@
                   <a:srgbClr val="FF0000"/>
                 </a:solidFill>
               </a:rPr>
-              <a:t> string&amp; s2) { return s1 &gt; s2; </a:t>
-            </a:r>
-            <a:r>
-              <a:rPr lang="en-US" altLang="ko-KR" dirty="0" smtClean="0">
-                <a:solidFill>
-                  <a:srgbClr val="FF0000"/>
-                </a:solidFill>
-              </a:rPr>
-              <a:t>}</a:t>
+              <a:t> string&amp; s2) { return s1 &gt; s2; }</a:t>
             </a:r>
             <a:r>
               <a:rPr lang="en-US" altLang="ko-KR" dirty="0" smtClean="0">
@@ -4796,16 +4808,7 @@
                 </a:solidFill>
                 <a:sym typeface="Wingdings" panose="05000000000000000000" pitchFamily="2" charset="2"/>
               </a:rPr>
-              <a:t>   </a:t>
-            </a:r>
-            <a:r>
-              <a:rPr lang="en-US" altLang="ko-KR" dirty="0" smtClean="0">
-                <a:solidFill>
-                  <a:schemeClr val="tx1"/>
-                </a:solidFill>
-                <a:sym typeface="Wingdings" panose="05000000000000000000" pitchFamily="2" charset="2"/>
-              </a:rPr>
-              <a:t>{ return s1 &gt; s2; }</a:t>
+              <a:t>   { return s1 &gt; s2; }</a:t>
             </a:r>
           </a:p>
           <a:p>
@@ -4967,7 +4970,63 @@
                   <a:schemeClr val="tx1"/>
                 </a:solidFill>
               </a:rPr>
-              <a:t> //      p();</a:t>
+              <a:t> //      </a:t>
+            </a:r>
+            <a:r>
+              <a:rPr lang="en-US" altLang="ko-KR" dirty="0" smtClean="0">
+                <a:solidFill>
+                  <a:schemeClr val="tx1"/>
+                </a:solidFill>
+              </a:rPr>
+              <a:t>(*p)(“</a:t>
+            </a:r>
+            <a:r>
+              <a:rPr lang="en-US" altLang="ko-KR" dirty="0" err="1" smtClean="0">
+                <a:solidFill>
+                  <a:schemeClr val="tx1"/>
+                </a:solidFill>
+              </a:rPr>
+              <a:t>abc</a:t>
+            </a:r>
+            <a:r>
+              <a:rPr lang="en-US" altLang="ko-KR" dirty="0" smtClean="0">
+                <a:solidFill>
+                  <a:schemeClr val="tx1"/>
+                </a:solidFill>
+              </a:rPr>
+              <a:t>”, “</a:t>
+            </a:r>
+            <a:r>
+              <a:rPr lang="en-US" altLang="ko-KR" dirty="0" err="1" smtClean="0">
+                <a:solidFill>
+                  <a:schemeClr val="tx1"/>
+                </a:solidFill>
+              </a:rPr>
+              <a:t>def</a:t>
+            </a:r>
+            <a:r>
+              <a:rPr lang="en-US" altLang="ko-KR" dirty="0" smtClean="0">
+                <a:solidFill>
+                  <a:schemeClr val="tx1"/>
+                </a:solidFill>
+              </a:rPr>
+              <a:t> </a:t>
+            </a:r>
+            <a:r>
+              <a:rPr lang="en-US" altLang="ko-KR" dirty="0" err="1" smtClean="0">
+                <a:solidFill>
+                  <a:schemeClr val="tx1"/>
+                </a:solidFill>
+              </a:rPr>
+              <a:t>ghi</a:t>
+            </a:r>
+            <a:r>
+              <a:rPr lang="en-US" altLang="ko-KR" dirty="0" smtClean="0">
+                <a:solidFill>
+                  <a:schemeClr val="tx1"/>
+                </a:solidFill>
+              </a:rPr>
+              <a:t>”);</a:t>
             </a:r>
             <a:endParaRPr lang="en-US" altLang="ko-KR" dirty="0">
               <a:solidFill>
@@ -5307,7 +5366,23 @@
                   <a:schemeClr val="tx1"/>
                 </a:solidFill>
               </a:rPr>
-              <a:t>	return [=] (</a:t>
+              <a:t>	return </a:t>
+            </a:r>
+            <a:r>
+              <a:rPr lang="en-US" altLang="ko-KR" dirty="0" smtClean="0">
+                <a:solidFill>
+                  <a:schemeClr val="tx1"/>
+                </a:solidFill>
+              </a:rPr>
+              <a:t>[x] </a:t>
+            </a:r>
+            <a:r>
+              <a:rPr lang="en-US" altLang="ko-KR" dirty="0" smtClean="0">
+                <a:solidFill>
+                  <a:schemeClr val="tx1"/>
+                </a:solidFill>
+              </a:rPr>
+              <a:t>(</a:t>
             </a:r>
             <a:r>
               <a:rPr lang="en-US" altLang="ko-KR" dirty="0" err="1" smtClean="0">
@@ -5323,18 +5398,73 @@
                   <a:schemeClr val="tx1"/>
                 </a:solidFill>
               </a:rPr>
+              <a:t> y) { return x + y; </a:t>
+            </a:r>
+            <a:r>
+              <a:rPr lang="en-US" altLang="ko-KR" dirty="0" smtClean="0">
+                <a:solidFill>
+                  <a:schemeClr val="tx1"/>
+                </a:solidFill>
+              </a:rPr>
+              <a:t>}; </a:t>
+            </a:r>
+          </a:p>
+          <a:p>
+            <a:r>
+              <a:rPr lang="en-US" altLang="ko-KR" dirty="0" smtClean="0">
+                <a:solidFill>
+                  <a:schemeClr val="tx1"/>
+                </a:solidFill>
+              </a:rPr>
+              <a:t>	};</a:t>
+            </a:r>
+          </a:p>
+          <a:p>
+            <a:r>
+              <a:rPr lang="en-US" altLang="ko-KR" dirty="0" smtClean="0">
+                <a:solidFill>
+                  <a:schemeClr val="tx1"/>
+                </a:solidFill>
+              </a:rPr>
+              <a:t>// cf. auto f = [] (</a:t>
+            </a:r>
+            <a:r>
+              <a:rPr lang="en-US" altLang="ko-KR" dirty="0" err="1" smtClean="0">
+                <a:solidFill>
+                  <a:schemeClr val="tx1"/>
+                </a:solidFill>
+              </a:rPr>
+              <a:t>int</a:t>
+            </a:r>
+            <a:r>
+              <a:rPr lang="en-US" altLang="ko-KR" dirty="0" smtClean="0">
+                <a:solidFill>
+                  <a:schemeClr val="tx1"/>
+                </a:solidFill>
+              </a:rPr>
+              <a:t> x, </a:t>
+            </a:r>
+            <a:r>
+              <a:rPr lang="en-US" altLang="ko-KR" dirty="0" err="1" smtClean="0">
+                <a:solidFill>
+                  <a:schemeClr val="tx1"/>
+                </a:solidFill>
+              </a:rPr>
+              <a:t>int</a:t>
+            </a:r>
+            <a:r>
+              <a:rPr lang="en-US" altLang="ko-KR" dirty="0" smtClean="0">
+                <a:solidFill>
+                  <a:schemeClr val="tx1"/>
+                </a:solidFill>
+              </a:rPr>
               <a:t> y) { return x + y; };</a:t>
             </a:r>
-          </a:p>
-          <a:p>
-            <a:r>
-              <a:rPr lang="en-US" altLang="ko-KR" dirty="0" smtClean="0">
-                <a:solidFill>
-                  <a:schemeClr val="tx1"/>
-                </a:solidFill>
-              </a:rPr>
-              <a:t>	};</a:t>
-            </a:r>
+            <a:endParaRPr lang="en-US" altLang="ko-KR" dirty="0" smtClean="0">
+              <a:solidFill>
+                <a:schemeClr val="tx1"/>
+              </a:solidFill>
+            </a:endParaRPr>
           </a:p>
           <a:p>
             <a:r>
@@ -5878,8 +6008,8 @@
           </a:p>
         </p:txBody>
       </p:sp>
-      <mc:AlternateContent xmlns:mc="http://schemas.openxmlformats.org/markup-compatibility/2006" xmlns:a14="http://schemas.microsoft.com/office/drawing/2010/main">
-        <mc:Choice Requires="a14">
+      <mc:AlternateContent xmlns:mc="http://schemas.openxmlformats.org/markup-compatibility/2006">
+        <mc:Choice xmlns:a14="http://schemas.microsoft.com/office/drawing/2010/main" Requires="a14">
           <p:sp>
             <p:nvSpPr>
               <p:cNvPr id="3" name="내용 개체 틀 2"/>
@@ -5898,7 +6028,7 @@
               <a:lstStyle/>
               <a:p>
                 <a:r>
-                  <a:rPr lang="ko-KR" altLang="en-US" dirty="0"/>
+                  <a:rPr lang="ko-KR" altLang="en-US" dirty="0" smtClean="0"/>
                   <a:t>람다 계산법 </a:t>
                 </a:r>
                 <a:r>
@@ -6103,10 +6233,56 @@
                           <a:rPr lang="en-US" altLang="ko-KR" i="1">
                             <a:latin typeface="Cambria Math" panose="02040503050406030204" pitchFamily="18" charset="0"/>
                           </a:rPr>
-                          <m:t> (1+2)</m:t>
+                          <m:t> </m:t>
                         </m:r>
+                        <m:d>
+                          <m:dPr>
+                            <m:ctrlPr>
+                              <a:rPr lang="en-US" altLang="ko-KR" i="1">
+                                <a:latin typeface="Cambria Math" panose="02040503050406030204" pitchFamily="18" charset="0"/>
+                              </a:rPr>
+                            </m:ctrlPr>
+                          </m:dPr>
+                          <m:e>
+                            <m:r>
+                              <a:rPr lang="en-US" altLang="ko-KR" i="1">
+                                <a:latin typeface="Cambria Math" panose="02040503050406030204" pitchFamily="18" charset="0"/>
+                              </a:rPr>
+                              <m:t>1+2</m:t>
+                            </m:r>
+                          </m:e>
+                        </m:d>
+                        <m:r>
+                          <a:rPr lang="en-US" altLang="ko-KR" b="0" i="1" smtClean="0">
+                            <a:latin typeface="Cambria Math" panose="02040503050406030204" pitchFamily="18" charset="0"/>
+                          </a:rPr>
+                          <m:t> </m:t>
+                        </m:r>
+                        <m:d>
+                          <m:dPr>
+                            <m:ctrlPr>
+                              <a:rPr lang="en-US" altLang="ko-KR" b="0" i="1" smtClean="0">
+                                <a:latin typeface="Cambria Math" panose="02040503050406030204" pitchFamily="18" charset="0"/>
+                              </a:rPr>
+                            </m:ctrlPr>
+                          </m:dPr>
+                          <m:e>
+                            <m:r>
+                              <a:rPr lang="en-US" altLang="ko-KR" b="0" i="1" smtClean="0">
+                                <a:latin typeface="Cambria Math" panose="02040503050406030204" pitchFamily="18" charset="0"/>
+                              </a:rPr>
+                              <m:t>1+2</m:t>
+                            </m:r>
+                          </m:e>
+                        </m:d>
                       </m:e>
                     </m:d>
+                    <m:r>
+                      <a:rPr lang="en-US" altLang="ko-KR" b="0" i="1" smtClean="0">
+                        <a:latin typeface="Cambria Math" panose="02040503050406030204" pitchFamily="18" charset="0"/>
+                      </a:rPr>
+                      <m:t> </m:t>
+                    </m:r>
                     <m:r>
                       <a:rPr lang="en-US" altLang="ko-KR" i="1">
                         <a:latin typeface="Cambria Math" panose="02040503050406030204" pitchFamily="18" charset="0"/>
@@ -6156,7 +6332,7 @@
                       <m:t>𝑦</m:t>
                     </m:r>
                     <m:r>
-                      <a:rPr lang="en-US" altLang="ko-KR" i="1">
+                      <a:rPr lang="en-US" altLang="ko-KR" b="0" i="1" smtClean="0">
                         <a:latin typeface="Cambria Math" panose="02040503050406030204" pitchFamily="18" charset="0"/>
                       </a:rPr>
                       <m:t>+</m:t>
@@ -6199,7 +6375,7 @@
             </p:txBody>
           </p:sp>
         </mc:Choice>
-        <mc:Fallback xmlns="">
+        <mc:Fallback>
           <p:sp>
             <p:nvSpPr>
               <p:cNvPr id="3" name="내용 개체 틀 2"/>
@@ -6214,7 +6390,7 @@
               <a:blipFill>
                 <a:blip r:embed="rId2"/>
                 <a:stretch>
-                  <a:fillRect l="-1391" t="-2661" r="-464" b="-16106"/>
+                  <a:fillRect l="-1391" t="-2661" r="-464" b="-16947"/>
                 </a:stretch>
               </a:blipFill>
             </p:spPr>
@@ -6445,8 +6621,17 @@
             <a:pPr lvl="1"/>
             <a:r>
               <a:rPr lang="en-US" altLang="ko-KR" dirty="0" smtClean="0"/>
-              <a:t>JavaScript(ES2015)</a:t>
-            </a:r>
+              <a:t>JavaScript(ES2015</a:t>
+            </a:r>
+            <a:r>
+              <a:rPr lang="en-US" altLang="ko-KR" dirty="0" smtClean="0"/>
+              <a:t>), </a:t>
+            </a:r>
+            <a:r>
+              <a:rPr lang="en-US" altLang="ko-KR" dirty="0" smtClean="0"/>
+              <a:t>Python (???)</a:t>
+            </a:r>
+            <a:endParaRPr lang="en-US" altLang="ko-KR" dirty="0" smtClean="0"/>
           </a:p>
           <a:p>
             <a:pPr lvl="1"/>

</xml_diff>